<commit_message>
Bug fix in the admin app
</commit_message>
<xml_diff>
--- a/Docs/Documentation/Presentations/Wander - Forum PI.pptx
+++ b/Docs/Documentation/Presentations/Wander - Forum PI.pptx
@@ -243,7 +243,7 @@
           <a:p>
             <a:fld id="{4D0CBB7A-33AF-434C-B8C5-B5F21D294CDF}" type="datetimeFigureOut">
               <a:rPr lang="tr-TR" smtClean="0"/>
-              <a:t>18.01.2016</a:t>
+              <a:t>19.01.2016</a:t>
             </a:fld>
             <a:endParaRPr lang="tr-TR"/>
           </a:p>
@@ -408,7 +408,7 @@
           <a:p>
             <a:fld id="{6C6C1039-E6FF-4F78-9751-FFD9A3AC8099}" type="datetimeFigureOut">
               <a:rPr lang="tr-TR" smtClean="0"/>
-              <a:t>18.01.2016</a:t>
+              <a:t>19.01.2016</a:t>
             </a:fld>
             <a:endParaRPr lang="tr-TR"/>
           </a:p>
@@ -2453,7 +2453,7 @@
           <a:p>
             <a:fld id="{DC9C75F7-98FD-4D05-8C3F-C506B544AE03}" type="datetimeFigureOut">
               <a:rPr lang="tr-TR" smtClean="0"/>
-              <a:t>18.01.2016</a:t>
+              <a:t>19.01.2016</a:t>
             </a:fld>
             <a:endParaRPr lang="tr-TR"/>
           </a:p>
@@ -2642,7 +2642,7 @@
           <a:p>
             <a:fld id="{DC9C75F7-98FD-4D05-8C3F-C506B544AE03}" type="datetimeFigureOut">
               <a:rPr lang="tr-TR" smtClean="0"/>
-              <a:t>18.01.2016</a:t>
+              <a:t>19.01.2016</a:t>
             </a:fld>
             <a:endParaRPr lang="tr-TR"/>
           </a:p>
@@ -2834,7 +2834,7 @@
           <a:p>
             <a:fld id="{DC9C75F7-98FD-4D05-8C3F-C506B544AE03}" type="datetimeFigureOut">
               <a:rPr lang="tr-TR" smtClean="0"/>
-              <a:t>18.01.2016</a:t>
+              <a:t>19.01.2016</a:t>
             </a:fld>
             <a:endParaRPr lang="tr-TR"/>
           </a:p>
@@ -3016,7 +3016,7 @@
           <a:p>
             <a:fld id="{DC9C75F7-98FD-4D05-8C3F-C506B544AE03}" type="datetimeFigureOut">
               <a:rPr lang="tr-TR" smtClean="0"/>
-              <a:t>18.01.2016</a:t>
+              <a:t>19.01.2016</a:t>
             </a:fld>
             <a:endParaRPr lang="tr-TR"/>
           </a:p>
@@ -3274,7 +3274,7 @@
           <a:p>
             <a:fld id="{DC9C75F7-98FD-4D05-8C3F-C506B544AE03}" type="datetimeFigureOut">
               <a:rPr lang="tr-TR" smtClean="0"/>
-              <a:t>18.01.2016</a:t>
+              <a:t>19.01.2016</a:t>
             </a:fld>
             <a:endParaRPr lang="tr-TR"/>
           </a:p>
@@ -3574,7 +3574,7 @@
           <a:p>
             <a:fld id="{DC9C75F7-98FD-4D05-8C3F-C506B544AE03}" type="datetimeFigureOut">
               <a:rPr lang="tr-TR" smtClean="0"/>
-              <a:t>18.01.2016</a:t>
+              <a:t>19.01.2016</a:t>
             </a:fld>
             <a:endParaRPr lang="tr-TR"/>
           </a:p>
@@ -4008,7 +4008,7 @@
           <a:p>
             <a:fld id="{DC9C75F7-98FD-4D05-8C3F-C506B544AE03}" type="datetimeFigureOut">
               <a:rPr lang="tr-TR" smtClean="0"/>
-              <a:t>18.01.2016</a:t>
+              <a:t>19.01.2016</a:t>
             </a:fld>
             <a:endParaRPr lang="tr-TR"/>
           </a:p>
@@ -4138,7 +4138,7 @@
           <a:p>
             <a:fld id="{DC9C75F7-98FD-4D05-8C3F-C506B544AE03}" type="datetimeFigureOut">
               <a:rPr lang="tr-TR" smtClean="0"/>
-              <a:t>18.01.2016</a:t>
+              <a:t>19.01.2016</a:t>
             </a:fld>
             <a:endParaRPr lang="tr-TR"/>
           </a:p>
@@ -4245,7 +4245,7 @@
           <a:p>
             <a:fld id="{DC9C75F7-98FD-4D05-8C3F-C506B544AE03}" type="datetimeFigureOut">
               <a:rPr lang="tr-TR" smtClean="0"/>
-              <a:t>18.01.2016</a:t>
+              <a:t>19.01.2016</a:t>
             </a:fld>
             <a:endParaRPr lang="tr-TR"/>
           </a:p>
@@ -4534,7 +4534,7 @@
           <a:p>
             <a:fld id="{DC9C75F7-98FD-4D05-8C3F-C506B544AE03}" type="datetimeFigureOut">
               <a:rPr lang="tr-TR" smtClean="0"/>
-              <a:t>18.01.2016</a:t>
+              <a:t>19.01.2016</a:t>
             </a:fld>
             <a:endParaRPr lang="tr-TR"/>
           </a:p>
@@ -4799,7 +4799,7 @@
           <a:p>
             <a:fld id="{DC9C75F7-98FD-4D05-8C3F-C506B544AE03}" type="datetimeFigureOut">
               <a:rPr lang="tr-TR" smtClean="0"/>
-              <a:t>18.01.2016</a:t>
+              <a:t>19.01.2016</a:t>
             </a:fld>
             <a:endParaRPr lang="tr-TR"/>
           </a:p>
@@ -5047,7 +5047,7 @@
           <a:p>
             <a:fld id="{DC9C75F7-98FD-4D05-8C3F-C506B544AE03}" type="datetimeFigureOut">
               <a:rPr lang="tr-TR" smtClean="0"/>
-              <a:t>18.01.2016</a:t>
+              <a:t>19.01.2016</a:t>
             </a:fld>
             <a:endParaRPr lang="tr-TR"/>
           </a:p>
@@ -10900,13 +10900,13 @@
   <p:clrMapOvr>
     <a:masterClrMapping/>
   </p:clrMapOvr>
-  <mc:AlternateContent xmlns:mc="http://schemas.openxmlformats.org/markup-compatibility/2006">
-    <mc:Choice xmlns:p14="http://schemas.microsoft.com/office/powerpoint/2010/main" Requires="p14">
+  <mc:AlternateContent xmlns:mc="http://schemas.openxmlformats.org/markup-compatibility/2006" xmlns:p14="http://schemas.microsoft.com/office/powerpoint/2010/main">
+    <mc:Choice Requires="p14">
       <p:transition spd="med" p14:dur="700">
         <p:fade/>
       </p:transition>
     </mc:Choice>
-    <mc:Fallback>
+    <mc:Fallback xmlns="">
       <p:transition spd="med">
         <p:fade/>
       </p:transition>
@@ -11417,13 +11417,13 @@
   <p:clrMapOvr>
     <a:masterClrMapping/>
   </p:clrMapOvr>
-  <mc:AlternateContent xmlns:mc="http://schemas.openxmlformats.org/markup-compatibility/2006">
-    <mc:Choice xmlns:p14="http://schemas.microsoft.com/office/powerpoint/2010/main" Requires="p14">
+  <mc:AlternateContent xmlns:mc="http://schemas.openxmlformats.org/markup-compatibility/2006" xmlns:p14="http://schemas.microsoft.com/office/powerpoint/2010/main">
+    <mc:Choice Requires="p14">
       <p:transition spd="med" p14:dur="700">
         <p:fade/>
       </p:transition>
     </mc:Choice>
-    <mc:Fallback>
+    <mc:Fallback xmlns="">
       <p:transition spd="med">
         <p:fade/>
       </p:transition>
@@ -13407,21 +13407,7 @@
                 <a:ea typeface="Open Sans" pitchFamily="34" charset="0"/>
                 <a:cs typeface="Open Sans" pitchFamily="34" charset="0"/>
               </a:rPr>
-              <a:t>Semestre </a:t>
-            </a:r>
-            <a:r>
-              <a:rPr lang="fr-FR" sz="2200" b="1" dirty="0" smtClean="0">
-                <a:solidFill>
-                  <a:schemeClr val="tx1">
-                    <a:lumMod val="65000"/>
-                    <a:lumOff val="35000"/>
-                  </a:schemeClr>
-                </a:solidFill>
-                <a:latin typeface="Caviar Dreams" pitchFamily="34" charset="-94"/>
-                <a:ea typeface="Open Sans" pitchFamily="34" charset="0"/>
-                <a:cs typeface="Open Sans" pitchFamily="34" charset="0"/>
-              </a:rPr>
-              <a:t>5</a:t>
+              <a:t>Semestre 5</a:t>
             </a:r>
             <a:endParaRPr lang="tr-TR" sz="2200" b="1" dirty="0">
               <a:solidFill>
@@ -13529,21 +13515,7 @@
                 <a:ea typeface="Open Sans" pitchFamily="34" charset="0"/>
                 <a:cs typeface="Open Sans" pitchFamily="34" charset="0"/>
               </a:rPr>
-              <a:t>Semestre </a:t>
-            </a:r>
-            <a:r>
-              <a:rPr lang="fr-FR" sz="2200" b="1" dirty="0" smtClean="0">
-                <a:solidFill>
-                  <a:schemeClr val="tx1">
-                    <a:lumMod val="65000"/>
-                    <a:lumOff val="35000"/>
-                  </a:schemeClr>
-                </a:solidFill>
-                <a:latin typeface="Caviar Dreams" pitchFamily="34" charset="-94"/>
-                <a:ea typeface="Open Sans" pitchFamily="34" charset="0"/>
-                <a:cs typeface="Open Sans" pitchFamily="34" charset="0"/>
-              </a:rPr>
-              <a:t>5</a:t>
+              <a:t>Semestre 5</a:t>
             </a:r>
             <a:endParaRPr lang="tr-TR" sz="2200" b="1" dirty="0">
               <a:solidFill>
@@ -14828,19 +14800,7 @@
                 </a:solidFill>
                 <a:latin typeface="Bebas Neue" panose="020B0606020202050201" pitchFamily="34" charset="0"/>
               </a:rPr>
-              <a:t>es </a:t>
-            </a:r>
-            <a:r>
-              <a:rPr lang="fr-FR" sz="4800" dirty="0" smtClean="0">
-                <a:solidFill>
-                  <a:schemeClr val="tx1">
-                    <a:lumMod val="65000"/>
-                    <a:lumOff val="35000"/>
-                  </a:schemeClr>
-                </a:solidFill>
-                <a:latin typeface="Bebas Neue" panose="020B0606020202050201" pitchFamily="34" charset="0"/>
-              </a:rPr>
-              <a:t>objectifs</a:t>
+              <a:t>es objectifs</a:t>
             </a:r>
           </a:p>
           <a:p>
@@ -14896,15 +14856,6 @@
               </a:rPr>
               <a:t>rganisation du projet</a:t>
             </a:r>
-            <a:endParaRPr lang="fr-FR" sz="4800" dirty="0" smtClean="0">
-              <a:solidFill>
-                <a:schemeClr val="tx1">
-                  <a:lumMod val="65000"/>
-                  <a:lumOff val="35000"/>
-                </a:schemeClr>
-              </a:solidFill>
-              <a:latin typeface="Bebas Neue" panose="020B0606020202050201" pitchFamily="34" charset="0"/>
-            </a:endParaRPr>
           </a:p>
           <a:p>
             <a:pPr marL="457200" indent="-457200">
@@ -14986,15 +14937,6 @@
               </a:rPr>
               <a:t>onclusion</a:t>
             </a:r>
-            <a:endParaRPr lang="fr-FR" sz="4800" dirty="0" smtClean="0">
-              <a:solidFill>
-                <a:schemeClr val="tx1">
-                  <a:lumMod val="65000"/>
-                  <a:lumOff val="35000"/>
-                </a:schemeClr>
-              </a:solidFill>
-              <a:latin typeface="Bebas Neue" panose="020B0606020202050201" pitchFamily="34" charset="0"/>
-            </a:endParaRPr>
           </a:p>
           <a:p>
             <a:pPr marL="457200" indent="-457200">
@@ -16673,13 +16615,13 @@
   <p:clrMapOvr>
     <a:masterClrMapping/>
   </p:clrMapOvr>
-  <mc:AlternateContent xmlns:mc="http://schemas.openxmlformats.org/markup-compatibility/2006">
-    <mc:Choice xmlns:p14="http://schemas.microsoft.com/office/powerpoint/2010/main" Requires="p14">
+  <mc:AlternateContent xmlns:mc="http://schemas.openxmlformats.org/markup-compatibility/2006" xmlns:p14="http://schemas.microsoft.com/office/powerpoint/2010/main">
+    <mc:Choice Requires="p14">
       <p:transition spd="med" p14:dur="700">
         <p:fade/>
       </p:transition>
     </mc:Choice>
-    <mc:Fallback>
+    <mc:Fallback xmlns="">
       <p:transition spd="med">
         <p:fade/>
       </p:transition>
@@ -17377,15 +17319,6 @@
               </a:rPr>
               <a:t>Mettre en place un système de stockage d’informations et de données des   joueurs </a:t>
             </a:r>
-            <a:endParaRPr lang="fr-FR" sz="3300" b="1" dirty="0">
-              <a:solidFill>
-                <a:schemeClr val="tx1">
-                  <a:lumMod val="65000"/>
-                  <a:lumOff val="35000"/>
-                </a:schemeClr>
-              </a:solidFill>
-              <a:latin typeface="Bebas Neue" panose="020B0606020202050201" pitchFamily="34" charset="0"/>
-            </a:endParaRPr>
           </a:p>
         </p:txBody>
       </p:sp>
@@ -17437,15 +17370,6 @@
               </a:rPr>
               <a:t> le client et le serveur </a:t>
             </a:r>
-            <a:endParaRPr lang="fr-FR" sz="3300" b="1" dirty="0">
-              <a:solidFill>
-                <a:schemeClr val="tx1">
-                  <a:lumMod val="65000"/>
-                  <a:lumOff val="35000"/>
-                </a:schemeClr>
-              </a:solidFill>
-              <a:latin typeface="Bebas Neue" panose="020B0606020202050201" pitchFamily="34" charset="0"/>
-            </a:endParaRPr>
           </a:p>
         </p:txBody>
       </p:sp>

</xml_diff>